<commit_message>
finish Computing Random Varialbes Preparation
</commit_message>
<xml_diff>
--- a/Computing Random Variables/Computing Random Variables.pptx
+++ b/Computing Random Variables/Computing Random Variables.pptx
@@ -251,7 +251,7 @@
           <a:p>
             <a:fld id="{DC78B61A-9D36-CF47-98EF-C95C99C43905}" type="datetimeFigureOut">
               <a:rPr lang="en-US" smtClean="0"/>
-              <a:t>4/5/17</a:t>
+              <a:t>4/6/17</a:t>
             </a:fld>
             <a:endParaRPr lang="en-US"/>
           </a:p>
@@ -2917,7 +2917,7 @@
           <a:lstStyle/>
           <a:p>
             <a:fld id="{3DEEB8FA-BE23-5545-BF4A-6EB8D4816639}" type="datetime1">
-              <a:t>2017/4/5</a:t>
+              <a:t>2017/4/6</a:t>
             </a:fld>
             <a:endParaRPr lang="en-US"/>
           </a:p>
@@ -3090,7 +3090,7 @@
           <a:lstStyle/>
           <a:p>
             <a:fld id="{0F2B2D94-AA8A-6144-AB64-0E78ECCA573B}" type="datetime1">
-              <a:t>2017/4/5</a:t>
+              <a:t>2017/4/6</a:t>
             </a:fld>
             <a:endParaRPr lang="en-US"/>
           </a:p>
@@ -3273,7 +3273,7 @@
           <a:lstStyle/>
           <a:p>
             <a:fld id="{F2B0A30F-AEA5-5943-B006-9F408C60A252}" type="datetime1">
-              <a:t>2017/4/5</a:t>
+              <a:t>2017/4/6</a:t>
             </a:fld>
             <a:endParaRPr lang="en-US"/>
           </a:p>
@@ -3446,7 +3446,7 @@
           <a:lstStyle/>
           <a:p>
             <a:fld id="{A9C3EEF9-5A0F-084C-8318-ED7902D27402}" type="datetime1">
-              <a:t>2017/4/5</a:t>
+              <a:t>2017/4/6</a:t>
             </a:fld>
             <a:endParaRPr lang="en-US"/>
           </a:p>
@@ -3695,7 +3695,7 @@
           <a:lstStyle/>
           <a:p>
             <a:fld id="{DCC9B718-1C3B-5E43-986F-7E905CFFE73C}" type="datetime1">
-              <a:t>2017/4/5</a:t>
+              <a:t>2017/4/6</a:t>
             </a:fld>
             <a:endParaRPr lang="en-US"/>
           </a:p>
@@ -3930,7 +3930,7 @@
           <a:lstStyle/>
           <a:p>
             <a:fld id="{DC36EED9-90A3-8B40-B811-55B8279FA5F5}" type="datetime1">
-              <a:t>2017/4/5</a:t>
+              <a:t>2017/4/6</a:t>
             </a:fld>
             <a:endParaRPr lang="en-US"/>
           </a:p>
@@ -4300,7 +4300,7 @@
           <a:lstStyle/>
           <a:p>
             <a:fld id="{C3BE899A-0FA6-2D41-AC3F-9C984AEBE645}" type="datetime1">
-              <a:t>2017/4/5</a:t>
+              <a:t>2017/4/6</a:t>
             </a:fld>
             <a:endParaRPr lang="en-US"/>
           </a:p>
@@ -4421,7 +4421,7 @@
           <a:lstStyle/>
           <a:p>
             <a:fld id="{1B9CEF58-CC2B-0148-B304-8BC3FFA6F8F3}" type="datetime1">
-              <a:t>2017/4/5</a:t>
+              <a:t>2017/4/6</a:t>
             </a:fld>
             <a:endParaRPr lang="en-US"/>
           </a:p>
@@ -4519,7 +4519,7 @@
           <a:lstStyle/>
           <a:p>
             <a:fld id="{76C13A98-66B9-4740-853B-9FECF8E3A193}" type="datetime1">
-              <a:t>2017/4/5</a:t>
+              <a:t>2017/4/6</a:t>
             </a:fld>
             <a:endParaRPr lang="en-US"/>
           </a:p>
@@ -4799,7 +4799,7 @@
           <a:lstStyle/>
           <a:p>
             <a:fld id="{39281DAD-D2ED-1242-B8A8-16820E15CD5D}" type="datetime1">
-              <a:t>2017/4/5</a:t>
+              <a:t>2017/4/6</a:t>
             </a:fld>
             <a:endParaRPr lang="en-US"/>
           </a:p>
@@ -5055,7 +5055,7 @@
           <a:lstStyle/>
           <a:p>
             <a:fld id="{3AF0487D-8E58-474C-86E7-E691EBA52C1E}" type="datetime1">
-              <a:t>2017/4/5</a:t>
+              <a:t>2017/4/6</a:t>
             </a:fld>
             <a:endParaRPr lang="en-US"/>
           </a:p>
@@ -5271,7 +5271,7 @@
           </a:lstStyle>
           <a:p>
             <a:fld id="{6645B1B6-826F-8447-B352-85686634A5E2}" type="datetime1">
-              <a:t>2017/4/5</a:t>
+              <a:t>2017/4/6</a:t>
             </a:fld>
             <a:endParaRPr lang="en-US"/>
           </a:p>
@@ -5778,7 +5778,7 @@
           <a:lstStyle/>
           <a:p>
             <a:fld id="{D3E65EC7-DA03-374F-BA80-106FF62C6660}" type="datetime1">
-              <a:t>2017/4/5</a:t>
+              <a:t>2017/4/6</a:t>
             </a:fld>
             <a:endParaRPr lang="en-US"/>
           </a:p>
@@ -6974,7 +6974,7 @@
           <a:lstStyle/>
           <a:p>
             <a:fld id="{99916043-67F5-3041-ADEE-D089CE4A8CF6}" type="datetime1">
-              <a:t>2017/4/5</a:t>
+              <a:t>2017/4/6</a:t>
             </a:fld>
             <a:endParaRPr lang="en-US"/>
           </a:p>
@@ -7759,7 +7759,7 @@
           <a:lstStyle/>
           <a:p>
             <a:fld id="{0FC07689-FDCA-9F49-A823-E31EE766DE66}" type="datetime1">
-              <a:t>2017/4/5</a:t>
+              <a:t>2017/4/6</a:t>
             </a:fld>
             <a:endParaRPr lang="en-US"/>
           </a:p>
@@ -9858,7 +9858,7 @@
           <a:lstStyle/>
           <a:p>
             <a:fld id="{4D2093E3-756D-F642-AA99-D12FB13C4B46}" type="datetime1">
-              <a:t>2017/4/5</a:t>
+              <a:t>2017/4/6</a:t>
             </a:fld>
             <a:endParaRPr lang="en-US"/>
           </a:p>
@@ -10854,7 +10854,7 @@
           <a:lstStyle/>
           <a:p>
             <a:fld id="{FCC97558-B1E2-F24F-89ED-263A13F37908}" type="datetime1">
-              <a:t>2017/4/5</a:t>
+              <a:t>2017/4/6</a:t>
             </a:fld>
             <a:endParaRPr lang="en-US"/>
           </a:p>
@@ -12511,7 +12511,7 @@
           <a:lstStyle/>
           <a:p>
             <a:fld id="{8317B32C-3C12-7E45-A676-1DF1C21B8767}" type="datetime1">
-              <a:t>2017/4/5</a:t>
+              <a:t>2017/4/6</a:t>
             </a:fld>
             <a:endParaRPr lang="en-US"/>
           </a:p>
@@ -15158,7 +15158,7 @@
           <a:lstStyle/>
           <a:p>
             <a:fld id="{1563E986-2784-954B-939D-44FBECB2727A}" type="datetime1">
-              <a:t>2017/4/5</a:t>
+              <a:t>2017/4/6</a:t>
             </a:fld>
             <a:endParaRPr lang="en-US"/>
           </a:p>
@@ -15677,7 +15677,7 @@
           <a:lstStyle/>
           <a:p>
             <a:fld id="{BBF5530D-138C-CD43-8429-1615A9C49E12}" type="datetime1">
-              <a:t>2017/4/5</a:t>
+              <a:t>2017/4/6</a:t>
             </a:fld>
             <a:endParaRPr lang="en-US"/>
           </a:p>
@@ -15918,7 +15918,7 @@
           <a:lstStyle/>
           <a:p>
             <a:fld id="{879BC2CF-A24E-054F-980D-9DAF9ACDFDE4}" type="datetime1">
-              <a:t>2017/4/5</a:t>
+              <a:t>2017/4/6</a:t>
             </a:fld>
             <a:endParaRPr lang="en-US"/>
           </a:p>
@@ -16326,7 +16326,7 @@
           <a:lstStyle/>
           <a:p>
             <a:fld id="{10624FBB-A9A3-2E4E-9D67-788934237D12}" type="datetime1">
-              <a:t>2017/4/5</a:t>
+              <a:t>2017/4/6</a:t>
             </a:fld>
             <a:endParaRPr lang="en-US"/>
           </a:p>
@@ -16547,7 +16547,7 @@
           <a:lstStyle/>
           <a:p>
             <a:fld id="{5823566E-C1C5-D34E-8F56-8E971719967A}" type="datetime1">
-              <a:t>2017/4/5</a:t>
+              <a:t>2017/4/6</a:t>
             </a:fld>
             <a:endParaRPr lang="en-US"/>
           </a:p>
@@ -16886,7 +16886,7 @@
           <a:lstStyle/>
           <a:p>
             <a:fld id="{39DEED49-1C1B-824E-B6EC-A22001794118}" type="datetime1">
-              <a:t>2017/4/5</a:t>
+              <a:t>2017/4/6</a:t>
             </a:fld>
             <a:endParaRPr lang="en-US"/>
           </a:p>
@@ -17581,7 +17581,7 @@
           <a:lstStyle/>
           <a:p>
             <a:fld id="{2880BDC9-7D05-F14E-BE5C-7ED9EADAE1F6}" type="datetime1">
-              <a:t>2017/4/5</a:t>
+              <a:t>2017/4/6</a:t>
             </a:fld>
             <a:endParaRPr lang="en-US"/>
           </a:p>
@@ -18340,7 +18340,7 @@
           <a:lstStyle/>
           <a:p>
             <a:fld id="{F36FDD4E-0158-1246-801D-BB5590E06F53}" type="datetime1">
-              <a:t>2017/4/5</a:t>
+              <a:t>2017/4/6</a:t>
             </a:fld>
             <a:endParaRPr lang="en-US"/>
           </a:p>
@@ -18636,7 +18636,7 @@
           <a:lstStyle/>
           <a:p>
             <a:fld id="{4418F8F2-06D4-A34E-8B05-AEFD9BF96C0D}" type="datetime1">
-              <a:t>2017/4/5</a:t>
+              <a:t>2017/4/6</a:t>
             </a:fld>
             <a:endParaRPr lang="en-US"/>
           </a:p>
@@ -18850,7 +18850,7 @@
           <a:lstStyle/>
           <a:p>
             <a:fld id="{64A97083-1148-8A48-9894-16C263A62818}" type="datetime1">
-              <a:t>2017/4/5</a:t>
+              <a:t>2017/4/6</a:t>
             </a:fld>
             <a:endParaRPr lang="en-US"/>
           </a:p>
@@ -20110,7 +20110,7 @@
           <a:lstStyle/>
           <a:p>
             <a:fld id="{7A9EF631-D7E1-5942-ACD0-E6D6B05F3D83}" type="datetime1">
-              <a:t>2017/4/5</a:t>
+              <a:t>2017/4/6</a:t>
             </a:fld>
             <a:endParaRPr lang="en-US"/>
           </a:p>
@@ -20853,7 +20853,7 @@
           <a:lstStyle/>
           <a:p>
             <a:fld id="{608959DC-D806-FB4C-A8FB-DB9246A56B44}" type="datetime1">
-              <a:t>2017/4/5</a:t>
+              <a:t>2017/4/6</a:t>
             </a:fld>
             <a:endParaRPr lang="en-US"/>
           </a:p>
@@ -21402,7 +21402,7 @@
           <a:lstStyle/>
           <a:p>
             <a:fld id="{656EBC31-3D28-E844-9738-1855CF3BDC34}" type="datetime1">
-              <a:t>2017/4/5</a:t>
+              <a:t>2017/4/6</a:t>
             </a:fld>
             <a:endParaRPr lang="en-US"/>
           </a:p>
@@ -22310,7 +22310,7 @@
           <a:lstStyle/>
           <a:p>
             <a:fld id="{40C637D8-E916-284B-9568-1A7DD9884FD7}" type="datetime1">
-              <a:t>2017/4/5</a:t>
+              <a:t>2017/4/6</a:t>
             </a:fld>
             <a:endParaRPr lang="en-US"/>
           </a:p>
@@ -22447,7 +22447,7 @@
           <a:lstStyle/>
           <a:p>
             <a:fld id="{BC5494BB-07FD-BE40-9046-BB2AD15E0654}" type="datetime1">
-              <a:t>2017/4/5</a:t>
+              <a:t>2017/4/6</a:t>
             </a:fld>
             <a:endParaRPr lang="en-US"/>
           </a:p>
@@ -22555,7 +22555,7 @@
           <a:lstStyle/>
           <a:p>
             <a:fld id="{7F1DEDC5-7D22-7F4A-8FF6-802241F87DFA}" type="datetime1">
-              <a:t>2017/4/5</a:t>
+              <a:t>2017/4/6</a:t>
             </a:fld>
             <a:endParaRPr lang="en-US"/>
           </a:p>
@@ -22904,7 +22904,7 @@
           <a:lstStyle/>
           <a:p>
             <a:fld id="{B583B2E4-A1C2-5441-A7A7-DB6DCEF99D2E}" type="datetime1">
-              <a:t>2017/4/5</a:t>
+              <a:t>2017/4/6</a:t>
             </a:fld>
             <a:endParaRPr lang="en-US"/>
           </a:p>
@@ -23017,8 +23017,8 @@
           </a:p>
         </p:txBody>
       </p:sp>
-      <mc:AlternateContent xmlns:mc="http://schemas.openxmlformats.org/markup-compatibility/2006">
-        <mc:Choice xmlns:a14="http://schemas.microsoft.com/office/drawing/2010/main" Requires="a14">
+      <mc:AlternateContent xmlns:mc="http://schemas.openxmlformats.org/markup-compatibility/2006" xmlns:a14="http://schemas.microsoft.com/office/drawing/2010/main">
+        <mc:Choice Requires="a14">
           <p:sp>
             <p:nvSpPr>
               <p:cNvPr id="3" name="Content Placeholder 2"/>
@@ -23397,7 +23397,7 @@
             </p:txBody>
           </p:sp>
         </mc:Choice>
-        <mc:Fallback>
+        <mc:Fallback xmlns="">
           <p:sp>
             <p:nvSpPr>
               <p:cNvPr id="3" name="Content Placeholder 2"/>
@@ -23447,7 +23447,7 @@
           <a:lstStyle/>
           <a:p>
             <a:fld id="{410CBA5E-BAA6-874A-84C9-4D8BF49F27EA}" type="datetime1">
-              <a:t>2017/4/5</a:t>
+              <a:t>2017/4/6</a:t>
             </a:fld>
             <a:endParaRPr lang="en-US"/>
           </a:p>
@@ -23626,8 +23626,8 @@
           </a:p>
         </p:txBody>
       </p:sp>
-      <mc:AlternateContent xmlns:mc="http://schemas.openxmlformats.org/markup-compatibility/2006">
-        <mc:Choice xmlns:a14="http://schemas.microsoft.com/office/drawing/2010/main" Requires="a14">
+      <mc:AlternateContent xmlns:mc="http://schemas.openxmlformats.org/markup-compatibility/2006" xmlns:a14="http://schemas.microsoft.com/office/drawing/2010/main">
+        <mc:Choice Requires="a14">
           <p:sp>
             <p:nvSpPr>
               <p:cNvPr id="3" name="Content Placeholder 2"/>
@@ -23667,23 +23667,7 @@
                     <a:ea typeface="Abadi MT Condensed Extra Bold" charset="0"/>
                     <a:cs typeface="Abadi MT Condensed Extra Bold" charset="0"/>
                   </a:rPr>
-                  <a:t>p</a:t>
-                </a:r>
-                <a:r>
-                  <a:rPr lang="en-US" altLang="zh-CN" sz="2600" dirty="0" err="1">
-                    <a:latin typeface="Abadi MT Condensed Extra Bold" charset="0"/>
-                    <a:ea typeface="Abadi MT Condensed Extra Bold" charset="0"/>
-                    <a:cs typeface="Abadi MT Condensed Extra Bold" charset="0"/>
-                  </a:rPr>
-                  <a:t>.</a:t>
-                </a:r>
-                <a:r>
-                  <a:rPr lang="en-US" altLang="zh-CN" sz="2600" dirty="0" err="1">
-                    <a:latin typeface="Abadi MT Condensed Extra Bold" charset="0"/>
-                    <a:ea typeface="Abadi MT Condensed Extra Bold" charset="0"/>
-                    <a:cs typeface="Abadi MT Condensed Extra Bold" charset="0"/>
-                  </a:rPr>
-                  <a:t>d.f</a:t>
+                  <a:t>p.d.f</a:t>
                 </a:r>
                 <a:r>
                   <a:rPr lang="zh-CN" altLang="en-US" sz="2600" dirty="0">
@@ -24537,7 +24521,7 @@
             </p:txBody>
           </p:sp>
         </mc:Choice>
-        <mc:Fallback>
+        <mc:Fallback xmlns="">
           <p:sp>
             <p:nvSpPr>
               <p:cNvPr id="3" name="Content Placeholder 2"/>
@@ -24587,7 +24571,7 @@
           <a:lstStyle/>
           <a:p>
             <a:fld id="{F002E5A1-9FA0-9E49-B903-039B4F72177F}" type="datetime1">
-              <a:t>2017/4/5</a:t>
+              <a:t>2017/4/6</a:t>
             </a:fld>
             <a:endParaRPr lang="en-US"/>
           </a:p>
@@ -24676,8 +24660,8 @@
           </a:p>
         </p:txBody>
       </p:sp>
-      <mc:AlternateContent xmlns:mc="http://schemas.openxmlformats.org/markup-compatibility/2006">
-        <mc:Choice xmlns:a14="http://schemas.microsoft.com/office/drawing/2010/main" Requires="a14">
+      <mc:AlternateContent xmlns:mc="http://schemas.openxmlformats.org/markup-compatibility/2006" xmlns:a14="http://schemas.microsoft.com/office/drawing/2010/main">
+        <mc:Choice Requires="a14">
           <p:sp>
             <p:nvSpPr>
               <p:cNvPr id="3" name="Content Placeholder 2"/>
@@ -24786,15 +24770,7 @@
                     <a:ea typeface="Abadi MT Condensed Extra Bold" charset="0"/>
                     <a:cs typeface="Abadi MT Condensed Extra Bold" charset="0"/>
                   </a:rPr>
-                  <a:t>的一个分布。</a:t>
-                </a:r>
-                <a:r>
-                  <a:rPr lang="zh-CN" altLang="en-US" sz="2600" dirty="0">
-                    <a:latin typeface="Abadi MT Condensed Extra Bold" charset="0"/>
-                    <a:ea typeface="Abadi MT Condensed Extra Bold" charset="0"/>
-                    <a:cs typeface="Abadi MT Condensed Extra Bold" charset="0"/>
-                  </a:rPr>
-                  <a:t>故 </a:t>
+                  <a:t>的一个分布。故 </a:t>
                 </a:r>
                 <a14:m>
                   <m:oMath xmlns:m="http://schemas.openxmlformats.org/officeDocument/2006/math">
@@ -25313,15 +25289,7 @@
                     <a:ea typeface="Abadi MT Condensed Extra Bold" charset="0"/>
                     <a:cs typeface="Abadi MT Condensed Extra Bold" charset="0"/>
                   </a:rPr>
-                  <a:t> </a:t>
-                </a:r>
-                <a:r>
-                  <a:rPr lang="zh-CN" altLang="en-US" sz="2200" dirty="0">
-                    <a:latin typeface="Abadi MT Condensed Extra Bold" charset="0"/>
-                    <a:ea typeface="Abadi MT Condensed Extra Bold" charset="0"/>
-                    <a:cs typeface="Abadi MT Condensed Extra Bold" charset="0"/>
-                  </a:rPr>
-                  <a:t>加上合适的假设确定边界条件，便可求解</a:t>
+                  <a:t> 加上合适的假设确定边界条件，便可求解</a:t>
                 </a:r>
                 <a:r>
                   <a:rPr lang="en-US" altLang="zh-CN" sz="2200" dirty="0">
@@ -25716,7 +25684,7 @@
             </p:txBody>
           </p:sp>
         </mc:Choice>
-        <mc:Fallback>
+        <mc:Fallback xmlns="">
           <p:sp>
             <p:nvSpPr>
               <p:cNvPr id="3" name="Content Placeholder 2"/>
@@ -25766,7 +25734,7 @@
           <a:lstStyle/>
           <a:p>
             <a:fld id="{F002E5A1-9FA0-9E49-B903-039B4F72177F}" type="datetime1">
-              <a:t>2017/4/5</a:t>
+              <a:t>2017/4/6</a:t>
             </a:fld>
             <a:endParaRPr lang="en-US"/>
           </a:p>
@@ -26067,7 +26035,7 @@
           <a:lstStyle/>
           <a:p>
             <a:fld id="{9B0043E3-6C32-3943-82CF-654DD120717C}" type="datetime1">
-              <a:t>2017/4/5</a:t>
+              <a:t>2017/4/6</a:t>
             </a:fld>
             <a:endParaRPr lang="en-US"/>
           </a:p>
@@ -26502,7 +26470,7 @@
           <a:lstStyle/>
           <a:p>
             <a:fld id="{A9C3EEF9-5A0F-084C-8318-ED7902D27402}" type="datetime1">
-              <a:t>2017/4/5</a:t>
+              <a:t>2017/4/6</a:t>
             </a:fld>
             <a:endParaRPr lang="en-US"/>
           </a:p>
@@ -26860,7 +26828,7 @@
           <a:lstStyle/>
           <a:p>
             <a:fld id="{8DDA57FE-640D-E44D-8537-654EC76B76E3}" type="datetime1">
-              <a:t>2017/4/5</a:t>
+              <a:t>2017/4/6</a:t>
             </a:fld>
             <a:endParaRPr lang="en-US"/>
           </a:p>
@@ -27020,7 +26988,7 @@
           <a:lstStyle/>
           <a:p>
             <a:fld id="{FE4D74E9-3710-B847-A25E-CC9C61BD9224}" type="datetime1">
-              <a:t>2017/4/5</a:t>
+              <a:t>2017/4/6</a:t>
             </a:fld>
             <a:endParaRPr lang="en-US"/>
           </a:p>
@@ -27325,7 +27293,7 @@
           <a:lstStyle/>
           <a:p>
             <a:fld id="{A9C3EEF9-5A0F-084C-8318-ED7902D27402}" type="datetime1">
-              <a:t>2017/4/5</a:t>
+              <a:t>2017/4/6</a:t>
             </a:fld>
             <a:endParaRPr lang="en-US"/>
           </a:p>
@@ -27557,7 +27525,7 @@
           <a:lstStyle/>
           <a:p>
             <a:fld id="{A9C3EEF9-5A0F-084C-8318-ED7902D27402}" type="datetime1">
-              <a:t>2017/4/5</a:t>
+              <a:t>2017/4/6</a:t>
             </a:fld>
             <a:endParaRPr lang="en-US"/>
           </a:p>
@@ -27646,8 +27614,8 @@
           </a:p>
         </p:txBody>
       </p:sp>
-      <mc:AlternateContent xmlns:mc="http://schemas.openxmlformats.org/markup-compatibility/2006">
-        <mc:Choice xmlns:a14="http://schemas.microsoft.com/office/drawing/2010/main" Requires="a14">
+      <mc:AlternateContent xmlns:mc="http://schemas.openxmlformats.org/markup-compatibility/2006" xmlns:a14="http://schemas.microsoft.com/office/drawing/2010/main">
+        <mc:Choice Requires="a14">
           <p:sp>
             <p:nvSpPr>
               <p:cNvPr id="3" name="Content Placeholder 2"/>
@@ -27916,7 +27884,7 @@
             </p:txBody>
           </p:sp>
         </mc:Choice>
-        <mc:Fallback>
+        <mc:Fallback xmlns="">
           <p:sp>
             <p:nvSpPr>
               <p:cNvPr id="3" name="Content Placeholder 2"/>
@@ -27966,7 +27934,7 @@
           <a:lstStyle/>
           <a:p>
             <a:fld id="{A9C3EEF9-5A0F-084C-8318-ED7902D27402}" type="datetime1">
-              <a:t>2017/4/5</a:t>
+              <a:t>2017/4/6</a:t>
             </a:fld>
             <a:endParaRPr lang="en-US"/>
           </a:p>
@@ -28226,7 +28194,7 @@
           <a:lstStyle/>
           <a:p>
             <a:fld id="{F37A162A-5BF8-0645-8913-EC5758170BFD}" type="datetime1">
-              <a:t>2017/4/5</a:t>
+              <a:t>2017/4/6</a:t>
             </a:fld>
             <a:endParaRPr lang="en-US"/>
           </a:p>
@@ -28395,7 +28363,7 @@
           <a:lstStyle/>
           <a:p>
             <a:fld id="{A9C3EEF9-5A0F-084C-8318-ED7902D27402}" type="datetime1">
-              <a:t>2017/4/5</a:t>
+              <a:t>2017/4/6</a:t>
             </a:fld>
             <a:endParaRPr lang="en-US"/>
           </a:p>
@@ -28757,7 +28725,7 @@
           <a:lstStyle/>
           <a:p>
             <a:fld id="{A9C3EEF9-5A0F-084C-8318-ED7902D27402}" type="datetime1">
-              <a:t>2017/4/5</a:t>
+              <a:t>2017/4/6</a:t>
             </a:fld>
             <a:endParaRPr lang="en-US"/>
           </a:p>
@@ -29131,7 +29099,7 @@
           <a:lstStyle/>
           <a:p>
             <a:fld id="{A9C3EEF9-5A0F-084C-8318-ED7902D27402}" type="datetime1">
-              <a:t>2017/4/5</a:t>
+              <a:t>2017/4/6</a:t>
             </a:fld>
             <a:endParaRPr lang="en-US"/>
           </a:p>
@@ -29811,7 +29779,7 @@
           <a:lstStyle/>
           <a:p>
             <a:fld id="{A9C3EEF9-5A0F-084C-8318-ED7902D27402}" type="datetime1">
-              <a:t>2017/4/5</a:t>
+              <a:t>2017/4/6</a:t>
             </a:fld>
             <a:endParaRPr lang="en-US"/>
           </a:p>
@@ -29900,8 +29868,8 @@
           </a:p>
         </p:txBody>
       </p:sp>
-      <mc:AlternateContent xmlns:mc="http://schemas.openxmlformats.org/markup-compatibility/2006">
-        <mc:Choice xmlns:a14="http://schemas.microsoft.com/office/drawing/2010/main" Requires="a14">
+      <mc:AlternateContent xmlns:mc="http://schemas.openxmlformats.org/markup-compatibility/2006" xmlns:a14="http://schemas.microsoft.com/office/drawing/2010/main">
+        <mc:Choice Requires="a14">
           <p:sp>
             <p:nvSpPr>
               <p:cNvPr id="3" name="Content Placeholder 2"/>
@@ -30047,7 +30015,7 @@
                       <m:sSubPr>
                         <m:ctrlPr>
                           <a:rPr lang="en-US" altLang="zh-CN" sz="2000" b="0" i="1">
-                            <a:latin typeface="Abadi MT Condensed Extra Bold" charset="0"/>
+                            <a:latin typeface="Cambria Math" charset="0"/>
                             <a:ea typeface="Abadi MT Condensed Extra Bold" charset="0"/>
                             <a:cs typeface="Abadi MT Condensed Extra Bold" charset="0"/>
                           </a:rPr>
@@ -30056,7 +30024,7 @@
                       <m:e>
                         <m:r>
                           <a:rPr lang="en-US" altLang="zh-CN" sz="2000" b="0" i="1">
-                            <a:latin typeface="Abadi MT Condensed Extra Bold" charset="0"/>
+                            <a:latin typeface="Cambria Math" charset="0"/>
                             <a:ea typeface="Abadi MT Condensed Extra Bold" charset="0"/>
                             <a:cs typeface="Abadi MT Condensed Extra Bold" charset="0"/>
                           </a:rPr>
@@ -30066,7 +30034,7 @@
                       <m:sub>
                         <m:r>
                           <a:rPr lang="en-US" altLang="zh-CN" sz="2000" b="0" i="1">
-                            <a:latin typeface="Abadi MT Condensed Extra Bold" charset="0"/>
+                            <a:latin typeface="Cambria Math" charset="0"/>
                             <a:ea typeface="Abadi MT Condensed Extra Bold" charset="0"/>
                             <a:cs typeface="Abadi MT Condensed Extra Bold" charset="0"/>
                           </a:rPr>
@@ -30076,7 +30044,7 @@
                     </m:sSub>
                     <m:r>
                       <a:rPr lang="en-US" altLang="zh-CN" sz="2000" b="0" i="1">
-                        <a:latin typeface="Abadi MT Condensed Extra Bold" charset="0"/>
+                        <a:latin typeface="Cambria Math" charset="0"/>
                         <a:ea typeface="Abadi MT Condensed Extra Bold" charset="0"/>
                         <a:cs typeface="Abadi MT Condensed Extra Bold" charset="0"/>
                       </a:rPr>
@@ -30086,7 +30054,7 @@
                       <m:sSubPr>
                         <m:ctrlPr>
                           <a:rPr lang="en-US" altLang="zh-CN" sz="2000" b="0" i="1">
-                            <a:latin typeface="Abadi MT Condensed Extra Bold" charset="0"/>
+                            <a:latin typeface="Cambria Math" charset="0"/>
                             <a:ea typeface="Abadi MT Condensed Extra Bold" charset="0"/>
                             <a:cs typeface="Abadi MT Condensed Extra Bold" charset="0"/>
                           </a:rPr>
@@ -30097,7 +30065,7 @@
                           <m:sSupPr>
                             <m:ctrlPr>
                               <a:rPr lang="en-US" altLang="zh-CN" sz="2000" b="0" i="1">
-                                <a:latin typeface="Abadi MT Condensed Extra Bold" charset="0"/>
+                                <a:latin typeface="Cambria Math" charset="0"/>
                                 <a:ea typeface="Abadi MT Condensed Extra Bold" charset="0"/>
                                 <a:cs typeface="Abadi MT Condensed Extra Bold" charset="0"/>
                               </a:rPr>
@@ -30106,7 +30074,7 @@
                           <m:e>
                             <m:r>
                               <a:rPr lang="en-US" altLang="zh-CN" sz="2000" b="0" i="1">
-                                <a:latin typeface="Abadi MT Condensed Extra Bold" charset="0"/>
+                                <a:latin typeface="Cambria Math" charset="0"/>
                                 <a:ea typeface="Abadi MT Condensed Extra Bold" charset="0"/>
                                 <a:cs typeface="Abadi MT Condensed Extra Bold" charset="0"/>
                               </a:rPr>
@@ -30116,7 +30084,7 @@
                           <m:sup>
                             <m:r>
                               <a:rPr lang="en-US" altLang="zh-CN" sz="2000" b="0" i="1">
-                                <a:latin typeface="Abadi MT Condensed Extra Bold" charset="0"/>
+                                <a:latin typeface="Cambria Math" charset="0"/>
                                 <a:ea typeface="Abadi MT Condensed Extra Bold" charset="0"/>
                                 <a:cs typeface="Abadi MT Condensed Extra Bold" charset="0"/>
                               </a:rPr>
@@ -30126,7 +30094,7 @@
                         </m:sSup>
                         <m:r>
                           <a:rPr lang="en-US" altLang="zh-CN" sz="2000" b="0" i="1">
-                            <a:latin typeface="Abadi MT Condensed Extra Bold" charset="0"/>
+                            <a:latin typeface="Cambria Math" charset="0"/>
                             <a:ea typeface="Abadi MT Condensed Extra Bold" charset="0"/>
                             <a:cs typeface="Abadi MT Condensed Extra Bold" charset="0"/>
                           </a:rPr>
@@ -30134,7 +30102,7 @@
                         </m:r>
                         <m:r>
                           <a:rPr lang="en-US" altLang="zh-CN" sz="2000" b="0" i="1">
-                            <a:latin typeface="Abadi MT Condensed Extra Bold" charset="0"/>
+                            <a:latin typeface="Cambria Math" charset="0"/>
                             <a:ea typeface="Abadi MT Condensed Extra Bold" charset="0"/>
                             <a:cs typeface="Abadi MT Condensed Extra Bold" charset="0"/>
                           </a:rPr>
@@ -30144,7 +30112,7 @@
                       <m:sub>
                         <m:r>
                           <a:rPr lang="en-US" altLang="zh-CN" sz="2000" b="0" i="1">
-                            <a:latin typeface="Abadi MT Condensed Extra Bold" charset="0"/>
+                            <a:latin typeface="Cambria Math" charset="0"/>
                             <a:ea typeface="Abadi MT Condensed Extra Bold" charset="0"/>
                             <a:cs typeface="Abadi MT Condensed Extra Bold" charset="0"/>
                           </a:rPr>
@@ -30154,7 +30122,7 @@
                     </m:sSub>
                     <m:r>
                       <a:rPr lang="en-US" altLang="zh-CN" sz="2000" b="0" i="1">
-                        <a:latin typeface="Abadi MT Condensed Extra Bold" charset="0"/>
+                        <a:latin typeface="Cambria Math" charset="0"/>
                         <a:ea typeface="Abadi MT Condensed Extra Bold" charset="0"/>
                         <a:cs typeface="Abadi MT Condensed Extra Bold" charset="0"/>
                       </a:rPr>
@@ -30162,7 +30130,7 @@
                     </m:r>
                     <m:r>
                       <a:rPr lang="zh-CN" altLang="en-US" sz="2000" b="0" i="1">
-                        <a:latin typeface="Abadi MT Condensed Extra Bold" charset="0"/>
+                        <a:latin typeface="Cambria Math" charset="0"/>
                         <a:ea typeface="Abadi MT Condensed Extra Bold" charset="0"/>
                         <a:cs typeface="Abadi MT Condensed Extra Bold" charset="0"/>
                       </a:rPr>
@@ -30172,7 +30140,7 @@
                       <m:sSubPr>
                         <m:ctrlPr>
                           <a:rPr lang="en-US" altLang="zh-CN" sz="2000" b="0" i="1">
-                            <a:latin typeface="Abadi MT Condensed Extra Bold" charset="0"/>
+                            <a:latin typeface="Cambria Math" charset="0"/>
                             <a:ea typeface="Abadi MT Condensed Extra Bold" charset="0"/>
                             <a:cs typeface="Abadi MT Condensed Extra Bold" charset="0"/>
                           </a:rPr>
@@ -30181,7 +30149,7 @@
                       <m:e>
                         <m:r>
                           <a:rPr lang="en-US" altLang="zh-CN" sz="2000" b="0" i="1">
-                            <a:latin typeface="Abadi MT Condensed Extra Bold" charset="0"/>
+                            <a:latin typeface="Cambria Math" charset="0"/>
                             <a:ea typeface="Abadi MT Condensed Extra Bold" charset="0"/>
                             <a:cs typeface="Abadi MT Condensed Extra Bold" charset="0"/>
                           </a:rPr>
@@ -30191,7 +30159,7 @@
                       <m:sub>
                         <m:r>
                           <a:rPr lang="en-US" altLang="zh-CN" sz="2000" b="0" i="1">
-                            <a:latin typeface="Abadi MT Condensed Extra Bold" charset="0"/>
+                            <a:latin typeface="Cambria Math" charset="0"/>
                             <a:ea typeface="Abadi MT Condensed Extra Bold" charset="0"/>
                             <a:cs typeface="Abadi MT Condensed Extra Bold" charset="0"/>
                           </a:rPr>
@@ -30201,7 +30169,7 @@
                     </m:sSub>
                     <m:r>
                       <a:rPr lang="en-US" altLang="zh-CN" sz="2000" b="0" i="1">
-                        <a:latin typeface="Abadi MT Condensed Extra Bold" charset="0"/>
+                        <a:latin typeface="Cambria Math" charset="0"/>
                         <a:ea typeface="Abadi MT Condensed Extra Bold" charset="0"/>
                         <a:cs typeface="Abadi MT Condensed Extra Bold" charset="0"/>
                       </a:rPr>
@@ -30209,7 +30177,7 @@
                     </m:r>
                     <m:r>
                       <a:rPr lang="zh-CN" altLang="en-US" sz="2000" b="0" i="1">
-                        <a:latin typeface="Abadi MT Condensed Extra Bold" charset="0"/>
+                        <a:latin typeface="Cambria Math" charset="0"/>
                         <a:ea typeface="Abadi MT Condensed Extra Bold" charset="0"/>
                         <a:cs typeface="Abadi MT Condensed Extra Bold" charset="0"/>
                       </a:rPr>
@@ -30217,7 +30185,7 @@
                     </m:r>
                     <m:r>
                       <a:rPr lang="en-US" altLang="zh-CN" sz="2000" b="0" i="1">
-                        <a:latin typeface="Abadi MT Condensed Extra Bold" charset="0"/>
+                        <a:latin typeface="Cambria Math" charset="0"/>
                         <a:ea typeface="Abadi MT Condensed Extra Bold" charset="0"/>
                         <a:cs typeface="Abadi MT Condensed Extra Bold" charset="0"/>
                       </a:rPr>
@@ -30266,7 +30234,7 @@
                       <m:sSubPr>
                         <m:ctrlPr>
                           <a:rPr lang="en-US" altLang="zh-CN" sz="2000" b="0" i="1">
-                            <a:latin typeface="Abadi MT Condensed Extra Bold" charset="0"/>
+                            <a:latin typeface="Cambria Math" charset="0"/>
                             <a:ea typeface="Abadi MT Condensed Extra Bold" charset="0"/>
                             <a:cs typeface="Abadi MT Condensed Extra Bold" charset="0"/>
                           </a:rPr>
@@ -30275,7 +30243,7 @@
                       <m:e>
                         <m:r>
                           <a:rPr lang="en-US" altLang="zh-CN" sz="2000" b="0" i="1">
-                            <a:latin typeface="Abadi MT Condensed Extra Bold" charset="0"/>
+                            <a:latin typeface="Cambria Math" charset="0"/>
                             <a:ea typeface="Abadi MT Condensed Extra Bold" charset="0"/>
                             <a:cs typeface="Abadi MT Condensed Extra Bold" charset="0"/>
                           </a:rPr>
@@ -30285,7 +30253,7 @@
                       <m:sub>
                         <m:r>
                           <a:rPr lang="en-US" altLang="zh-CN" sz="2000" b="0" i="1">
-                            <a:latin typeface="Abadi MT Condensed Extra Bold" charset="0"/>
+                            <a:latin typeface="Cambria Math" charset="0"/>
                             <a:ea typeface="Abadi MT Condensed Extra Bold" charset="0"/>
                             <a:cs typeface="Abadi MT Condensed Extra Bold" charset="0"/>
                           </a:rPr>
@@ -30309,7 +30277,7 @@
                       <m:sSubPr>
                         <m:ctrlPr>
                           <a:rPr lang="en-US" altLang="zh-CN" sz="2000" i="1">
-                            <a:latin typeface="Abadi MT Condensed Extra Bold" charset="0"/>
+                            <a:latin typeface="Cambria Math" charset="0"/>
                             <a:ea typeface="Abadi MT Condensed Extra Bold" charset="0"/>
                             <a:cs typeface="Abadi MT Condensed Extra Bold" charset="0"/>
                           </a:rPr>
@@ -30318,7 +30286,7 @@
                       <m:e>
                         <m:r>
                           <a:rPr lang="en-US" altLang="zh-CN" sz="2000" i="1">
-                            <a:latin typeface="Abadi MT Condensed Extra Bold" charset="0"/>
+                            <a:latin typeface="Cambria Math" charset="0"/>
                             <a:ea typeface="Abadi MT Condensed Extra Bold" charset="0"/>
                             <a:cs typeface="Abadi MT Condensed Extra Bold" charset="0"/>
                           </a:rPr>
@@ -30328,7 +30296,7 @@
                       <m:sub>
                         <m:r>
                           <a:rPr lang="en-US" altLang="zh-CN" sz="2000" b="0" i="1">
-                            <a:latin typeface="Abadi MT Condensed Extra Bold" charset="0"/>
+                            <a:latin typeface="Cambria Math" charset="0"/>
                             <a:ea typeface="Abadi MT Condensed Extra Bold" charset="0"/>
                             <a:cs typeface="Abadi MT Condensed Extra Bold" charset="0"/>
                           </a:rPr>
@@ -30352,7 +30320,7 @@
                       <m:sSubPr>
                         <m:ctrlPr>
                           <a:rPr lang="en-US" altLang="zh-CN" sz="2000" i="1">
-                            <a:latin typeface="Abadi MT Condensed Extra Bold" charset="0"/>
+                            <a:latin typeface="Cambria Math" charset="0"/>
                             <a:ea typeface="Abadi MT Condensed Extra Bold" charset="0"/>
                             <a:cs typeface="Abadi MT Condensed Extra Bold" charset="0"/>
                           </a:rPr>
@@ -30361,7 +30329,7 @@
                       <m:e>
                         <m:r>
                           <a:rPr lang="en-US" altLang="zh-CN" sz="2000" i="1">
-                            <a:latin typeface="Abadi MT Condensed Extra Bold" charset="0"/>
+                            <a:latin typeface="Cambria Math" charset="0"/>
                             <a:ea typeface="Abadi MT Condensed Extra Bold" charset="0"/>
                             <a:cs typeface="Abadi MT Condensed Extra Bold" charset="0"/>
                           </a:rPr>
@@ -30371,7 +30339,7 @@
                       <m:sub>
                         <m:r>
                           <a:rPr lang="en-US" altLang="zh-CN" sz="2000" i="1">
-                            <a:latin typeface="Abadi MT Condensed Extra Bold" charset="0"/>
+                            <a:latin typeface="Cambria Math" charset="0"/>
                             <a:ea typeface="Abadi MT Condensed Extra Bold" charset="0"/>
                             <a:cs typeface="Abadi MT Condensed Extra Bold" charset="0"/>
                           </a:rPr>
@@ -30381,7 +30349,7 @@
                     </m:sSub>
                     <m:r>
                       <a:rPr lang="en-US" altLang="zh-CN" sz="2000" i="1">
-                        <a:latin typeface="Abadi MT Condensed Extra Bold" charset="0"/>
+                        <a:latin typeface="Cambria Math" charset="0"/>
                         <a:ea typeface="Abadi MT Condensed Extra Bold" charset="0"/>
                         <a:cs typeface="Abadi MT Condensed Extra Bold" charset="0"/>
                       </a:rPr>
@@ -30389,7 +30357,7 @@
                     </m:r>
                     <m:r>
                       <a:rPr lang="zh-CN" altLang="en-US" sz="2000" i="1">
-                        <a:latin typeface="Abadi MT Condensed Extra Bold" charset="0"/>
+                        <a:latin typeface="Cambria Math" charset="0"/>
                         <a:ea typeface="Abadi MT Condensed Extra Bold" charset="0"/>
                         <a:cs typeface="Abadi MT Condensed Extra Bold" charset="0"/>
                       </a:rPr>
@@ -30399,7 +30367,7 @@
                       <m:sSubPr>
                         <m:ctrlPr>
                           <a:rPr lang="en-US" altLang="zh-CN" sz="2000" i="1">
-                            <a:latin typeface="Abadi MT Condensed Extra Bold" charset="0"/>
+                            <a:latin typeface="Cambria Math" charset="0"/>
                             <a:ea typeface="Abadi MT Condensed Extra Bold" charset="0"/>
                             <a:cs typeface="Abadi MT Condensed Extra Bold" charset="0"/>
                           </a:rPr>
@@ -30408,7 +30376,7 @@
                       <m:e>
                         <m:r>
                           <a:rPr lang="en-US" altLang="zh-CN" sz="2000" i="1">
-                            <a:latin typeface="Abadi MT Condensed Extra Bold" charset="0"/>
+                            <a:latin typeface="Cambria Math" charset="0"/>
                             <a:ea typeface="Abadi MT Condensed Extra Bold" charset="0"/>
                             <a:cs typeface="Abadi MT Condensed Extra Bold" charset="0"/>
                           </a:rPr>
@@ -30418,7 +30386,7 @@
                       <m:sub>
                         <m:r>
                           <a:rPr lang="en-US" altLang="zh-CN" sz="2000" i="1">
-                            <a:latin typeface="Abadi MT Condensed Extra Bold" charset="0"/>
+                            <a:latin typeface="Cambria Math" charset="0"/>
                             <a:ea typeface="Abadi MT Condensed Extra Bold" charset="0"/>
                             <a:cs typeface="Abadi MT Condensed Extra Bold" charset="0"/>
                           </a:rPr>
@@ -30428,7 +30396,7 @@
                     </m:sSub>
                     <m:r>
                       <a:rPr lang="en-US" altLang="zh-CN" sz="2000" i="1">
-                        <a:latin typeface="Abadi MT Condensed Extra Bold" charset="0"/>
+                        <a:latin typeface="Cambria Math" charset="0"/>
                         <a:ea typeface="Abadi MT Condensed Extra Bold" charset="0"/>
                         <a:cs typeface="Abadi MT Condensed Extra Bold" charset="0"/>
                       </a:rPr>
@@ -30436,7 +30404,7 @@
                     </m:r>
                     <m:r>
                       <a:rPr lang="zh-CN" altLang="en-US" sz="2000" i="1">
-                        <a:latin typeface="Abadi MT Condensed Extra Bold" charset="0"/>
+                        <a:latin typeface="Cambria Math" charset="0"/>
                         <a:ea typeface="Abadi MT Condensed Extra Bold" charset="0"/>
                         <a:cs typeface="Abadi MT Condensed Extra Bold" charset="0"/>
                       </a:rPr>
@@ -30444,7 +30412,7 @@
                     </m:r>
                     <m:r>
                       <a:rPr lang="en-US" altLang="zh-CN" sz="2000" i="1">
-                        <a:latin typeface="Abadi MT Condensed Extra Bold" charset="0"/>
+                        <a:latin typeface="Cambria Math" charset="0"/>
                         <a:ea typeface="Abadi MT Condensed Extra Bold" charset="0"/>
                         <a:cs typeface="Abadi MT Condensed Extra Bold" charset="0"/>
                       </a:rPr>
@@ -30538,7 +30506,7 @@
                       <m:sSubPr>
                         <m:ctrlPr>
                           <a:rPr lang="en-US" altLang="zh-CN" sz="2000" i="1">
-                            <a:latin typeface="Abadi MT Condensed Extra Bold" charset="0"/>
+                            <a:latin typeface="Cambria Math" charset="0"/>
                             <a:ea typeface="Abadi MT Condensed Extra Bold" charset="0"/>
                             <a:cs typeface="Abadi MT Condensed Extra Bold" charset="0"/>
                           </a:rPr>
@@ -30547,7 +30515,7 @@
                       <m:e>
                         <m:r>
                           <a:rPr lang="en-US" altLang="zh-CN" sz="2000" i="1">
-                            <a:latin typeface="Abadi MT Condensed Extra Bold" charset="0"/>
+                            <a:latin typeface="Cambria Math" charset="0"/>
                             <a:ea typeface="Abadi MT Condensed Extra Bold" charset="0"/>
                             <a:cs typeface="Abadi MT Condensed Extra Bold" charset="0"/>
                           </a:rPr>
@@ -30557,7 +30525,7 @@
                       <m:sub>
                         <m:r>
                           <a:rPr lang="en-US" altLang="zh-CN" sz="2000" i="1">
-                            <a:latin typeface="Abadi MT Condensed Extra Bold" charset="0"/>
+                            <a:latin typeface="Cambria Math" charset="0"/>
                             <a:ea typeface="Abadi MT Condensed Extra Bold" charset="0"/>
                             <a:cs typeface="Abadi MT Condensed Extra Bold" charset="0"/>
                           </a:rPr>
@@ -30567,7 +30535,7 @@
                     </m:sSub>
                     <m:r>
                       <a:rPr lang="en-US" altLang="zh-CN" sz="2000" b="0" i="1">
-                        <a:latin typeface="Abadi MT Condensed Extra Bold" charset="0"/>
+                        <a:latin typeface="Cambria Math" charset="0"/>
                         <a:ea typeface="Abadi MT Condensed Extra Bold" charset="0"/>
                         <a:cs typeface="Abadi MT Condensed Extra Bold" charset="0"/>
                       </a:rPr>
@@ -30575,7 +30543,7 @@
                     </m:r>
                     <m:r>
                       <a:rPr lang="en-US" altLang="zh-CN" sz="2000" b="0" i="1">
-                        <a:latin typeface="Abadi MT Condensed Extra Bold" charset="0"/>
+                        <a:latin typeface="Cambria Math" charset="0"/>
                         <a:ea typeface="Abadi MT Condensed Extra Bold" charset="0"/>
                         <a:cs typeface="Abadi MT Condensed Extra Bold" charset="0"/>
                       </a:rPr>
@@ -30583,25 +30551,17 @@
                     </m:r>
                     <m:r>
                       <a:rPr lang="en-US" altLang="zh-CN" sz="2000" b="0" i="1">
-                        <a:latin typeface="Abadi MT Condensed Extra Bold" charset="0"/>
+                        <a:latin typeface="Cambria Math" charset="0"/>
                         <a:ea typeface="Abadi MT Condensed Extra Bold" charset="0"/>
                         <a:cs typeface="Abadi MT Condensed Extra Bold" charset="0"/>
                       </a:rPr>
-                      <m:t>),</m:t>
-                    </m:r>
-                    <m:r>
-                      <a:rPr lang="zh-CN" altLang="en-US" sz="2000" i="1">
-                        <a:latin typeface="Abadi MT Condensed Extra Bold" charset="0"/>
-                        <a:ea typeface="Abadi MT Condensed Extra Bold" charset="0"/>
-                        <a:cs typeface="Abadi MT Condensed Extra Bold" charset="0"/>
-                      </a:rPr>
-                      <m:t> </m:t>
+                      <m:t>), </m:t>
                     </m:r>
                     <m:sSub>
                       <m:sSubPr>
                         <m:ctrlPr>
                           <a:rPr lang="en-US" altLang="zh-CN" sz="2000" i="1">
-                            <a:latin typeface="Abadi MT Condensed Extra Bold" charset="0"/>
+                            <a:latin typeface="Cambria Math" charset="0"/>
                             <a:ea typeface="Abadi MT Condensed Extra Bold" charset="0"/>
                             <a:cs typeface="Abadi MT Condensed Extra Bold" charset="0"/>
                           </a:rPr>
@@ -30610,7 +30570,7 @@
                       <m:e>
                         <m:r>
                           <a:rPr lang="en-US" altLang="zh-CN" sz="2000" i="1">
-                            <a:latin typeface="Abadi MT Condensed Extra Bold" charset="0"/>
+                            <a:latin typeface="Cambria Math" charset="0"/>
                             <a:ea typeface="Abadi MT Condensed Extra Bold" charset="0"/>
                             <a:cs typeface="Abadi MT Condensed Extra Bold" charset="0"/>
                           </a:rPr>
@@ -30620,7 +30580,7 @@
                       <m:sub>
                         <m:r>
                           <a:rPr lang="en-US" altLang="zh-CN" sz="2000" i="1">
-                            <a:latin typeface="Abadi MT Condensed Extra Bold" charset="0"/>
+                            <a:latin typeface="Cambria Math" charset="0"/>
                             <a:ea typeface="Abadi MT Condensed Extra Bold" charset="0"/>
                             <a:cs typeface="Abadi MT Condensed Extra Bold" charset="0"/>
                           </a:rPr>
@@ -30630,7 +30590,7 @@
                     </m:sSub>
                     <m:r>
                       <a:rPr lang="en-US" altLang="zh-CN" sz="2000" b="0" i="1">
-                        <a:latin typeface="Abadi MT Condensed Extra Bold" charset="0"/>
+                        <a:latin typeface="Cambria Math" charset="0"/>
                         <a:ea typeface="Abadi MT Condensed Extra Bold" charset="0"/>
                         <a:cs typeface="Abadi MT Condensed Extra Bold" charset="0"/>
                       </a:rPr>
@@ -30638,7 +30598,7 @@
                     </m:r>
                     <m:r>
                       <a:rPr lang="en-US" altLang="zh-CN" sz="2000" b="0" i="1">
-                        <a:latin typeface="Abadi MT Condensed Extra Bold" charset="0"/>
+                        <a:latin typeface="Cambria Math" charset="0"/>
                         <a:ea typeface="Abadi MT Condensed Extra Bold" charset="0"/>
                         <a:cs typeface="Abadi MT Condensed Extra Bold" charset="0"/>
                       </a:rPr>
@@ -30646,35 +30606,11 @@
                     </m:r>
                     <m:r>
                       <a:rPr lang="en-US" altLang="zh-CN" sz="2000" b="0" i="1">
-                        <a:latin typeface="Abadi MT Condensed Extra Bold" charset="0"/>
+                        <a:latin typeface="Cambria Math" charset="0"/>
                         <a:ea typeface="Abadi MT Condensed Extra Bold" charset="0"/>
                         <a:cs typeface="Abadi MT Condensed Extra Bold" charset="0"/>
                       </a:rPr>
-                      <m:t>),</m:t>
-                    </m:r>
-                    <m:r>
-                      <a:rPr lang="zh-CN" altLang="en-US" sz="2000" i="1">
-                        <a:latin typeface="Abadi MT Condensed Extra Bold" charset="0"/>
-                        <a:ea typeface="Abadi MT Condensed Extra Bold" charset="0"/>
-                        <a:cs typeface="Abadi MT Condensed Extra Bold" charset="0"/>
-                      </a:rPr>
-                      <m:t> </m:t>
-                    </m:r>
-                    <m:r>
-                      <a:rPr lang="en-US" altLang="zh-CN" sz="2000" i="1">
-                        <a:latin typeface="Abadi MT Condensed Extra Bold" charset="0"/>
-                        <a:ea typeface="Abadi MT Condensed Extra Bold" charset="0"/>
-                        <a:cs typeface="Abadi MT Condensed Extra Bold" charset="0"/>
-                      </a:rPr>
-                      <m:t>…</m:t>
-                    </m:r>
-                    <m:r>
-                      <a:rPr lang="en-US" altLang="zh-CN" sz="2000" b="0" i="1">
-                        <a:latin typeface="Abadi MT Condensed Extra Bold" charset="0"/>
-                        <a:ea typeface="Abadi MT Condensed Extra Bold" charset="0"/>
-                        <a:cs typeface="Abadi MT Condensed Extra Bold" charset="0"/>
-                      </a:rPr>
-                      <m:t>)</m:t>
+                      <m:t>), …)</m:t>
                     </m:r>
                   </m:oMath>
                 </a14:m>
@@ -30748,7 +30684,7 @@
                       <m:sSubPr>
                         <m:ctrlPr>
                           <a:rPr lang="en-US" altLang="zh-CN" sz="2000" i="1">
-                            <a:latin typeface="Abadi MT Condensed Extra Bold" charset="0"/>
+                            <a:latin typeface="Cambria Math" charset="0"/>
                             <a:ea typeface="Abadi MT Condensed Extra Bold" charset="0"/>
                             <a:cs typeface="Abadi MT Condensed Extra Bold" charset="0"/>
                           </a:rPr>
@@ -30757,7 +30693,7 @@
                       <m:e>
                         <m:r>
                           <a:rPr lang="en-US" altLang="zh-CN" sz="2000" i="1">
-                            <a:latin typeface="Abadi MT Condensed Extra Bold" charset="0"/>
+                            <a:latin typeface="Cambria Math" charset="0"/>
                             <a:ea typeface="Abadi MT Condensed Extra Bold" charset="0"/>
                             <a:cs typeface="Abadi MT Condensed Extra Bold" charset="0"/>
                           </a:rPr>
@@ -30767,7 +30703,7 @@
                       <m:sub>
                         <m:r>
                           <a:rPr lang="en-US" altLang="zh-CN" sz="2000" i="1">
-                            <a:latin typeface="Abadi MT Condensed Extra Bold" charset="0"/>
+                            <a:latin typeface="Cambria Math" charset="0"/>
                             <a:ea typeface="Abadi MT Condensed Extra Bold" charset="0"/>
                             <a:cs typeface="Abadi MT Condensed Extra Bold" charset="0"/>
                           </a:rPr>
@@ -30777,7 +30713,7 @@
                     </m:sSub>
                     <m:r>
                       <a:rPr lang="zh-CN" altLang="en-US" sz="2000" i="1">
-                        <a:latin typeface="Abadi MT Condensed Extra Bold" charset="0"/>
+                        <a:latin typeface="Cambria Math" charset="0"/>
                         <a:ea typeface="Abadi MT Condensed Extra Bold" charset="0"/>
                         <a:cs typeface="Abadi MT Condensed Extra Bold" charset="0"/>
                       </a:rPr>
@@ -30807,7 +30743,7 @@
                       <m:sSubPr>
                         <m:ctrlPr>
                           <a:rPr lang="en-US" altLang="zh-CN" sz="2000" i="1">
-                            <a:latin typeface="Abadi MT Condensed Extra Bold" charset="0"/>
+                            <a:latin typeface="Cambria Math" charset="0"/>
                             <a:ea typeface="Abadi MT Condensed Extra Bold" charset="0"/>
                             <a:cs typeface="Abadi MT Condensed Extra Bold" charset="0"/>
                           </a:rPr>
@@ -30816,7 +30752,7 @@
                       <m:e>
                         <m:r>
                           <a:rPr lang="en-US" altLang="zh-CN" sz="2000" i="1">
-                            <a:latin typeface="Abadi MT Condensed Extra Bold" charset="0"/>
+                            <a:latin typeface="Cambria Math" charset="0"/>
                             <a:ea typeface="Abadi MT Condensed Extra Bold" charset="0"/>
                             <a:cs typeface="Abadi MT Condensed Extra Bold" charset="0"/>
                           </a:rPr>
@@ -30826,7 +30762,7 @@
                       <m:sub>
                         <m:r>
                           <a:rPr lang="en-US" altLang="zh-CN" sz="2000" i="1">
-                            <a:latin typeface="Abadi MT Condensed Extra Bold" charset="0"/>
+                            <a:latin typeface="Cambria Math" charset="0"/>
                             <a:ea typeface="Abadi MT Condensed Extra Bold" charset="0"/>
                             <a:cs typeface="Abadi MT Condensed Extra Bold" charset="0"/>
                           </a:rPr>
@@ -30873,7 +30809,7 @@
             </p:txBody>
           </p:sp>
         </mc:Choice>
-        <mc:Fallback>
+        <mc:Fallback xmlns="">
           <p:sp>
             <p:nvSpPr>
               <p:cNvPr id="3" name="Content Placeholder 2"/>
@@ -30926,7 +30862,7 @@
           <a:lstStyle/>
           <a:p>
             <a:fld id="{A9C3EEF9-5A0F-084C-8318-ED7902D27402}" type="datetime1">
-              <a:t>2017/4/5</a:t>
+              <a:t>2017/4/6</a:t>
             </a:fld>
             <a:endParaRPr lang="en-US"/>
           </a:p>
@@ -31583,8 +31519,8 @@
           </a:p>
         </p:txBody>
       </p:sp>
-      <mc:AlternateContent xmlns:mc="http://schemas.openxmlformats.org/markup-compatibility/2006">
-        <mc:Choice xmlns:a14="http://schemas.microsoft.com/office/drawing/2010/main" Requires="a14">
+      <mc:AlternateContent xmlns:mc="http://schemas.openxmlformats.org/markup-compatibility/2006" xmlns:a14="http://schemas.microsoft.com/office/drawing/2010/main">
+        <mc:Choice Requires="a14">
           <p:sp>
             <p:nvSpPr>
               <p:cNvPr id="3" name="Content Placeholder 2"/>
@@ -32162,15 +32098,7 @@
                     <a:ea typeface="Abadi MT Condensed Extra Bold" charset="0"/>
                     <a:cs typeface="Abadi MT Condensed Extra Bold" charset="0"/>
                   </a:rPr>
-                  <a:t>等</a:t>
-                </a:r>
-                <a:r>
-                  <a:rPr lang="zh-CN" altLang="en-US" sz="2000">
-                    <a:latin typeface="Abadi MT Condensed Extra Bold" charset="0"/>
-                    <a:ea typeface="Abadi MT Condensed Extra Bold" charset="0"/>
-                    <a:cs typeface="Abadi MT Condensed Extra Bold" charset="0"/>
-                  </a:rPr>
-                  <a:t>非多项式目标优化函数，是否有用呢？</a:t>
+                  <a:t>等非多项式目标优化函数，是否有用呢？</a:t>
                 </a:r>
                 <a:endParaRPr lang="en-US" altLang="zh-CN" sz="2000">
                   <a:latin typeface="Abadi MT Condensed Extra Bold" charset="0"/>
@@ -32943,7 +32871,7 @@
             </p:txBody>
           </p:sp>
         </mc:Choice>
-        <mc:Fallback>
+        <mc:Fallback xmlns="">
           <p:sp>
             <p:nvSpPr>
               <p:cNvPr id="3" name="Content Placeholder 2"/>
@@ -32993,7 +32921,7 @@
           <a:lstStyle/>
           <a:p>
             <a:fld id="{A9C3EEF9-5A0F-084C-8318-ED7902D27402}" type="datetime1">
-              <a:t>2017/4/5</a:t>
+              <a:t>2017/4/6</a:t>
             </a:fld>
             <a:endParaRPr lang="en-US"/>
           </a:p>
@@ -33355,8 +33283,8 @@
           </a:p>
         </p:txBody>
       </p:sp>
-      <mc:AlternateContent xmlns:mc="http://schemas.openxmlformats.org/markup-compatibility/2006">
-        <mc:Choice xmlns:a14="http://schemas.microsoft.com/office/drawing/2010/main" Requires="a14">
+      <mc:AlternateContent xmlns:mc="http://schemas.openxmlformats.org/markup-compatibility/2006" xmlns:a14="http://schemas.microsoft.com/office/drawing/2010/main">
+        <mc:Choice Requires="a14">
           <p:sp>
             <p:nvSpPr>
               <p:cNvPr id="3" name="Content Placeholder 2"/>
@@ -34428,7 +34356,7 @@
             </p:txBody>
           </p:sp>
         </mc:Choice>
-        <mc:Fallback>
+        <mc:Fallback xmlns="">
           <p:sp>
             <p:nvSpPr>
               <p:cNvPr id="3" name="Content Placeholder 2"/>
@@ -34717,8 +34645,8 @@
           </a:fontRef>
         </p:style>
       </p:cxnSp>
-      <mc:AlternateContent xmlns:mc="http://schemas.openxmlformats.org/markup-compatibility/2006">
-        <mc:Choice xmlns:a14="http://schemas.microsoft.com/office/drawing/2010/main" Requires="a14">
+      <mc:AlternateContent xmlns:mc="http://schemas.openxmlformats.org/markup-compatibility/2006" xmlns:a14="http://schemas.microsoft.com/office/drawing/2010/main">
+        <mc:Choice Requires="a14">
           <p:sp>
             <p:nvSpPr>
               <p:cNvPr id="21" name="TextBox 20"/>
@@ -34741,6 +34669,7 @@
               </a:bodyPr>
               <a:lstStyle/>
               <a:p>
+                <a:pPr/>
                 <a14:m>
                   <m:oMathPara xmlns:m="http://schemas.openxmlformats.org/officeDocument/2006/math">
                     <m:oMathParaPr>
@@ -34801,7 +34730,7 @@
             </p:txBody>
           </p:sp>
         </mc:Choice>
-        <mc:Fallback>
+        <mc:Fallback xmlns="">
           <p:sp>
             <p:nvSpPr>
               <p:cNvPr id="21" name="TextBox 20"/>
@@ -34840,8 +34769,8 @@
           </p:sp>
         </mc:Fallback>
       </mc:AlternateContent>
-      <mc:AlternateContent xmlns:mc="http://schemas.openxmlformats.org/markup-compatibility/2006">
-        <mc:Choice xmlns:a14="http://schemas.microsoft.com/office/drawing/2010/main" Requires="a14">
+      <mc:AlternateContent xmlns:mc="http://schemas.openxmlformats.org/markup-compatibility/2006" xmlns:a14="http://schemas.microsoft.com/office/drawing/2010/main">
+        <mc:Choice Requires="a14">
           <p:sp>
             <p:nvSpPr>
               <p:cNvPr id="22" name="TextBox 21"/>
@@ -34864,6 +34793,7 @@
               </a:bodyPr>
               <a:lstStyle/>
               <a:p>
+                <a:pPr/>
                 <a14:m>
                   <m:oMathPara xmlns:m="http://schemas.openxmlformats.org/officeDocument/2006/math">
                     <m:oMathParaPr>
@@ -34924,7 +34854,7 @@
             </p:txBody>
           </p:sp>
         </mc:Choice>
-        <mc:Fallback>
+        <mc:Fallback xmlns="">
           <p:sp>
             <p:nvSpPr>
               <p:cNvPr id="22" name="TextBox 21"/>
@@ -34963,8 +34893,8 @@
           </p:sp>
         </mc:Fallback>
       </mc:AlternateContent>
-      <mc:AlternateContent xmlns:mc="http://schemas.openxmlformats.org/markup-compatibility/2006">
-        <mc:Choice xmlns:a14="http://schemas.microsoft.com/office/drawing/2010/main" Requires="a14">
+      <mc:AlternateContent xmlns:mc="http://schemas.openxmlformats.org/markup-compatibility/2006" xmlns:a14="http://schemas.microsoft.com/office/drawing/2010/main">
+        <mc:Choice Requires="a14">
           <p:sp>
             <p:nvSpPr>
               <p:cNvPr id="23" name="TextBox 22"/>
@@ -34987,6 +34917,7 @@
               </a:bodyPr>
               <a:lstStyle/>
               <a:p>
+                <a:pPr/>
                 <a14:m>
                   <m:oMathPara xmlns:m="http://schemas.openxmlformats.org/officeDocument/2006/math">
                     <m:oMathParaPr>
@@ -35047,7 +34978,7 @@
             </p:txBody>
           </p:sp>
         </mc:Choice>
-        <mc:Fallback>
+        <mc:Fallback xmlns="">
           <p:sp>
             <p:nvSpPr>
               <p:cNvPr id="23" name="TextBox 22"/>
@@ -35116,8 +35047,8 @@
           </a:fontRef>
         </p:style>
       </p:cxnSp>
-      <mc:AlternateContent xmlns:mc="http://schemas.openxmlformats.org/markup-compatibility/2006">
-        <mc:Choice xmlns:a14="http://schemas.microsoft.com/office/drawing/2010/main" Requires="a14">
+      <mc:AlternateContent xmlns:mc="http://schemas.openxmlformats.org/markup-compatibility/2006" xmlns:a14="http://schemas.microsoft.com/office/drawing/2010/main">
+        <mc:Choice Requires="a14">
           <p:sp>
             <p:nvSpPr>
               <p:cNvPr id="28" name="TextBox 27"/>
@@ -35140,6 +35071,7 @@
               </a:bodyPr>
               <a:lstStyle/>
               <a:p>
+                <a:pPr/>
                 <a14:m>
                   <m:oMathPara xmlns:m="http://schemas.openxmlformats.org/officeDocument/2006/math">
                     <m:oMathParaPr>
@@ -35209,7 +35141,7 @@
             </p:txBody>
           </p:sp>
         </mc:Choice>
-        <mc:Fallback>
+        <mc:Fallback xmlns="">
           <p:sp>
             <p:nvSpPr>
               <p:cNvPr id="28" name="TextBox 27"/>
@@ -35286,8 +35218,8 @@
           </a:fontRef>
         </p:style>
       </p:cxnSp>
-      <mc:AlternateContent xmlns:mc="http://schemas.openxmlformats.org/markup-compatibility/2006">
-        <mc:Choice xmlns:a14="http://schemas.microsoft.com/office/drawing/2010/main" Requires="a14">
+      <mc:AlternateContent xmlns:mc="http://schemas.openxmlformats.org/markup-compatibility/2006" xmlns:a14="http://schemas.microsoft.com/office/drawing/2010/main">
+        <mc:Choice Requires="a14">
           <p:sp>
             <p:nvSpPr>
               <p:cNvPr id="33" name="TextBox 32"/>
@@ -35310,6 +35242,7 @@
               </a:bodyPr>
               <a:lstStyle/>
               <a:p>
+                <a:pPr/>
                 <a14:m>
                   <m:oMathPara xmlns:m="http://schemas.openxmlformats.org/officeDocument/2006/math">
                     <m:oMathParaPr>
@@ -35411,7 +35344,7 @@
             </p:txBody>
           </p:sp>
         </mc:Choice>
-        <mc:Fallback>
+        <mc:Fallback xmlns="">
           <p:sp>
             <p:nvSpPr>
               <p:cNvPr id="33" name="TextBox 32"/>
@@ -35561,8 +35494,8 @@
           </a:p>
         </p:txBody>
       </p:sp>
-      <mc:AlternateContent xmlns:mc="http://schemas.openxmlformats.org/markup-compatibility/2006">
-        <mc:Choice xmlns:a14="http://schemas.microsoft.com/office/drawing/2010/main" Requires="a14">
+      <mc:AlternateContent xmlns:mc="http://schemas.openxmlformats.org/markup-compatibility/2006" xmlns:a14="http://schemas.microsoft.com/office/drawing/2010/main">
+        <mc:Choice Requires="a14">
           <p:sp>
             <p:nvSpPr>
               <p:cNvPr id="3" name="Content Placeholder 2"/>
@@ -35701,7 +35634,7 @@
                         <a:ea typeface="Cambria Math" charset="0"/>
                         <a:cs typeface="Cambria Math" charset="0"/>
                       </a:rPr>
-                      <m:t>∇</m:t>
+                      <m:t>𝛻</m:t>
                     </m:r>
                     <m:r>
                       <a:rPr lang="en-US" altLang="zh-CN" i="1">
@@ -35819,7 +35752,7 @@
                         <a:ea typeface="Cambria Math" charset="0"/>
                         <a:cs typeface="Cambria Math" charset="0"/>
                       </a:rPr>
-                      <m:t>∇</m:t>
+                      <m:t>𝛻</m:t>
                     </m:r>
                     <m:sSub>
                       <m:sSubPr>
@@ -36472,7 +36405,7 @@
             </p:txBody>
           </p:sp>
         </mc:Choice>
-        <mc:Fallback>
+        <mc:Fallback xmlns="">
           <p:sp>
             <p:nvSpPr>
               <p:cNvPr id="3" name="Content Placeholder 2"/>
@@ -36761,8 +36694,8 @@
           </a:fontRef>
         </p:style>
       </p:cxnSp>
-      <mc:AlternateContent xmlns:mc="http://schemas.openxmlformats.org/markup-compatibility/2006">
-        <mc:Choice xmlns:a14="http://schemas.microsoft.com/office/drawing/2010/main" Requires="a14">
+      <mc:AlternateContent xmlns:mc="http://schemas.openxmlformats.org/markup-compatibility/2006" xmlns:a14="http://schemas.microsoft.com/office/drawing/2010/main">
+        <mc:Choice Requires="a14">
           <p:sp>
             <p:nvSpPr>
               <p:cNvPr id="21" name="TextBox 20"/>
@@ -36785,6 +36718,7 @@
               </a:bodyPr>
               <a:lstStyle/>
               <a:p>
+                <a:pPr/>
                 <a14:m>
                   <m:oMathPara xmlns:m="http://schemas.openxmlformats.org/officeDocument/2006/math">
                     <m:oMathParaPr>
@@ -36845,7 +36779,7 @@
             </p:txBody>
           </p:sp>
         </mc:Choice>
-        <mc:Fallback>
+        <mc:Fallback xmlns="">
           <p:sp>
             <p:nvSpPr>
               <p:cNvPr id="21" name="TextBox 20"/>
@@ -36884,8 +36818,8 @@
           </p:sp>
         </mc:Fallback>
       </mc:AlternateContent>
-      <mc:AlternateContent xmlns:mc="http://schemas.openxmlformats.org/markup-compatibility/2006">
-        <mc:Choice xmlns:a14="http://schemas.microsoft.com/office/drawing/2010/main" Requires="a14">
+      <mc:AlternateContent xmlns:mc="http://schemas.openxmlformats.org/markup-compatibility/2006" xmlns:a14="http://schemas.microsoft.com/office/drawing/2010/main">
+        <mc:Choice Requires="a14">
           <p:sp>
             <p:nvSpPr>
               <p:cNvPr id="22" name="TextBox 21"/>
@@ -36908,6 +36842,7 @@
               </a:bodyPr>
               <a:lstStyle/>
               <a:p>
+                <a:pPr/>
                 <a14:m>
                   <m:oMathPara xmlns:m="http://schemas.openxmlformats.org/officeDocument/2006/math">
                     <m:oMathParaPr>
@@ -36968,7 +36903,7 @@
             </p:txBody>
           </p:sp>
         </mc:Choice>
-        <mc:Fallback>
+        <mc:Fallback xmlns="">
           <p:sp>
             <p:nvSpPr>
               <p:cNvPr id="22" name="TextBox 21"/>
@@ -37007,8 +36942,8 @@
           </p:sp>
         </mc:Fallback>
       </mc:AlternateContent>
-      <mc:AlternateContent xmlns:mc="http://schemas.openxmlformats.org/markup-compatibility/2006">
-        <mc:Choice xmlns:a14="http://schemas.microsoft.com/office/drawing/2010/main" Requires="a14">
+      <mc:AlternateContent xmlns:mc="http://schemas.openxmlformats.org/markup-compatibility/2006" xmlns:a14="http://schemas.microsoft.com/office/drawing/2010/main">
+        <mc:Choice Requires="a14">
           <p:sp>
             <p:nvSpPr>
               <p:cNvPr id="23" name="TextBox 22"/>
@@ -37031,6 +36966,7 @@
               </a:bodyPr>
               <a:lstStyle/>
               <a:p>
+                <a:pPr/>
                 <a14:m>
                   <m:oMathPara xmlns:m="http://schemas.openxmlformats.org/officeDocument/2006/math">
                     <m:oMathParaPr>
@@ -37091,7 +37027,7 @@
             </p:txBody>
           </p:sp>
         </mc:Choice>
-        <mc:Fallback>
+        <mc:Fallback xmlns="">
           <p:sp>
             <p:nvSpPr>
               <p:cNvPr id="23" name="TextBox 22"/>
@@ -37160,8 +37096,8 @@
           </a:fontRef>
         </p:style>
       </p:cxnSp>
-      <mc:AlternateContent xmlns:mc="http://schemas.openxmlformats.org/markup-compatibility/2006">
-        <mc:Choice xmlns:a14="http://schemas.microsoft.com/office/drawing/2010/main" Requires="a14">
+      <mc:AlternateContent xmlns:mc="http://schemas.openxmlformats.org/markup-compatibility/2006" xmlns:a14="http://schemas.microsoft.com/office/drawing/2010/main">
+        <mc:Choice Requires="a14">
           <p:sp>
             <p:nvSpPr>
               <p:cNvPr id="28" name="TextBox 27"/>
@@ -37184,6 +37120,7 @@
               </a:bodyPr>
               <a:lstStyle/>
               <a:p>
+                <a:pPr/>
                 <a14:m>
                   <m:oMathPara xmlns:m="http://schemas.openxmlformats.org/officeDocument/2006/math">
                     <m:oMathParaPr>
@@ -37253,7 +37190,7 @@
             </p:txBody>
           </p:sp>
         </mc:Choice>
-        <mc:Fallback>
+        <mc:Fallback xmlns="">
           <p:sp>
             <p:nvSpPr>
               <p:cNvPr id="28" name="TextBox 27"/>
@@ -37330,8 +37267,8 @@
           </a:fontRef>
         </p:style>
       </p:cxnSp>
-      <mc:AlternateContent xmlns:mc="http://schemas.openxmlformats.org/markup-compatibility/2006">
-        <mc:Choice xmlns:a14="http://schemas.microsoft.com/office/drawing/2010/main" Requires="a14">
+      <mc:AlternateContent xmlns:mc="http://schemas.openxmlformats.org/markup-compatibility/2006" xmlns:a14="http://schemas.microsoft.com/office/drawing/2010/main">
+        <mc:Choice Requires="a14">
           <p:sp>
             <p:nvSpPr>
               <p:cNvPr id="33" name="TextBox 32"/>
@@ -37354,6 +37291,7 @@
               </a:bodyPr>
               <a:lstStyle/>
               <a:p>
+                <a:pPr/>
                 <a14:m>
                   <m:oMathPara xmlns:m="http://schemas.openxmlformats.org/officeDocument/2006/math">
                     <m:oMathParaPr>
@@ -37455,7 +37393,7 @@
             </p:txBody>
           </p:sp>
         </mc:Choice>
-        <mc:Fallback>
+        <mc:Fallback xmlns="">
           <p:sp>
             <p:nvSpPr>
               <p:cNvPr id="33" name="TextBox 32"/>
@@ -39024,7 +38962,7 @@
           <a:lstStyle/>
           <a:p>
             <a:fld id="{54DD5CB5-E5B5-5C4C-A4DF-4DCF0470A6FF}" type="datetime1">
-              <a:t>2017/4/5</a:t>
+              <a:t>2017/4/6</a:t>
             </a:fld>
             <a:endParaRPr lang="en-US"/>
           </a:p>
@@ -39125,7 +39063,7 @@
           <a:lstStyle/>
           <a:p>
             <a:fld id="{A9C3EEF9-5A0F-084C-8318-ED7902D27402}" type="datetime1">
-              <a:t>2017/4/5</a:t>
+              <a:t>2017/4/6</a:t>
             </a:fld>
             <a:endParaRPr lang="en-US"/>
           </a:p>
@@ -39332,7 +39270,7 @@
           <a:lstStyle/>
           <a:p>
             <a:fld id="{A9C3EEF9-5A0F-084C-8318-ED7902D27402}" type="datetime1">
-              <a:t>2017/4/5</a:t>
+              <a:t>2017/4/6</a:t>
             </a:fld>
             <a:endParaRPr lang="en-US"/>
           </a:p>
@@ -39568,7 +39506,7 @@
           <a:lstStyle/>
           <a:p>
             <a:fld id="{A9C3EEF9-5A0F-084C-8318-ED7902D27402}" type="datetime1">
-              <a:t>2017/4/5</a:t>
+              <a:t>2017/4/6</a:t>
             </a:fld>
             <a:endParaRPr lang="en-US"/>
           </a:p>
@@ -40598,7 +40536,7 @@
           <a:lstStyle/>
           <a:p>
             <a:fld id="{540AF92D-3078-384F-8BAF-27DC692980DB}" type="datetime1">
-              <a:t>2017/4/5</a:t>
+              <a:t>2017/4/6</a:t>
             </a:fld>
             <a:endParaRPr lang="en-US"/>
           </a:p>
@@ -40850,7 +40788,7 @@
           <a:lstStyle/>
           <a:p>
             <a:fld id="{0DB59BE0-6898-BF41-8B0E-F0649116281E}" type="datetime1">
-              <a:t>2017/4/5</a:t>
+              <a:t>2017/4/6</a:t>
             </a:fld>
             <a:endParaRPr lang="en-US"/>
           </a:p>
@@ -41590,7 +41528,7 @@
           <a:lstStyle/>
           <a:p>
             <a:fld id="{39A60990-886A-364F-98E0-D2E36993EAA7}" type="datetime1">
-              <a:t>2017/4/5</a:t>
+              <a:t>2017/4/6</a:t>
             </a:fld>
             <a:endParaRPr lang="en-US"/>
           </a:p>
@@ -42391,7 +42329,7 @@
           <a:lstStyle/>
           <a:p>
             <a:fld id="{FE31BBE7-34C2-324D-A4D7-C6F28451EBE5}" type="datetime1">
-              <a:t>2017/4/5</a:t>
+              <a:t>2017/4/6</a:t>
             </a:fld>
             <a:endParaRPr lang="en-US"/>
           </a:p>

</xml_diff>